<commit_message>
update Thread work Detail
</commit_message>
<xml_diff>
--- a/Document/하이레벨 + 스레드(ver2.0).pptx
+++ b/Document/하이레벨 + 스레드(ver2.0).pptx
@@ -5,7 +5,7 @@
     <p:sldMasterId id="2147483648" r:id="rId1"/>
   </p:sldMasterIdLst>
   <p:notesMasterIdLst>
-    <p:notesMasterId r:id="rId8"/>
+    <p:notesMasterId r:id="rId9"/>
   </p:notesMasterIdLst>
   <p:sldIdLst>
     <p:sldId id="256" r:id="rId2"/>
@@ -14,6 +14,7 @@
     <p:sldId id="262" r:id="rId5"/>
     <p:sldId id="260" r:id="rId6"/>
     <p:sldId id="259" r:id="rId7"/>
+    <p:sldId id="263" r:id="rId8"/>
   </p:sldIdLst>
   <p:sldSz cx="12801600" cy="9601200" type="A3"/>
   <p:notesSz cx="6858000" cy="9144000"/>
@@ -262,7 +263,7 @@
       </p15:sldGuideLst>
     </p:ext>
     <p:ext uri="http://customooxmlschemas.google.com/">
-      <go:slidesCustomData xmlns:mc="http://schemas.openxmlformats.org/markup-compatibility/2006" xmlns:mv="urn:schemas-microsoft-com:mac:vml" xmlns:c="http://schemas.openxmlformats.org/drawingml/2006/chart" xmlns:dgm="http://schemas.openxmlformats.org/drawingml/2006/diagram" xmlns:o="urn:schemas-microsoft-com:office:office" xmlns:v="urn:schemas-microsoft-com:vml" xmlns:pvml="urn:schemas-microsoft-com:office:powerpoint" xmlns:com="http://schemas.openxmlformats.org/drawingml/2006/compatibility" xmlns:p14="http://schemas.microsoft.com/office/powerpoint/2010/main" xmlns:p15="http://schemas.microsoft.com/office/powerpoint/2012/main" xmlns:ahyp="http://schemas.microsoft.com/office/drawing/2018/hyperlinkcolor" xmlns:go="http://customooxmlschemas.google.com/" xmlns="" r:id="rId10" roundtripDataSignature="AMtx7mhWvF19jUqzQu0tH54U2TaSRWn9gA=="/>
+      <go:slidesCustomData xmlns="" xmlns:go="http://customooxmlschemas.google.com/" xmlns:ahyp="http://schemas.microsoft.com/office/drawing/2018/hyperlinkcolor" xmlns:p15="http://schemas.microsoft.com/office/powerpoint/2012/main" xmlns:p14="http://schemas.microsoft.com/office/powerpoint/2010/main" xmlns:com="http://schemas.openxmlformats.org/drawingml/2006/compatibility" xmlns:pvml="urn:schemas-microsoft-com:office:powerpoint" xmlns:v="urn:schemas-microsoft-com:vml" xmlns:o="urn:schemas-microsoft-com:office:office" xmlns:dgm="http://schemas.openxmlformats.org/drawingml/2006/diagram" xmlns:c="http://schemas.openxmlformats.org/drawingml/2006/chart" xmlns:mv="urn:schemas-microsoft-com:mac:vml" xmlns:mc="http://schemas.openxmlformats.org/markup-compatibility/2006" r:id="rId10" roundtripDataSignature="AMtx7mhWvF19jUqzQu0tH54U2TaSRWn9gA=="/>
     </p:ext>
   </p:extLst>
 </p:presentation>
@@ -26358,6 +26359,1432 @@
 </p:sld>
 </file>
 
+<file path=ppt/slides/slide7.xml><?xml version="1.0" encoding="utf-8"?>
+<p:sld xmlns:a="http://schemas.openxmlformats.org/drawingml/2006/main" xmlns:r="http://schemas.openxmlformats.org/officeDocument/2006/relationships" xmlns:p="http://schemas.openxmlformats.org/presentationml/2006/main">
+  <p:cSld>
+    <p:spTree>
+      <p:nvGrpSpPr>
+        <p:cNvPr id="1" name=""/>
+        <p:cNvGrpSpPr/>
+        <p:nvPr/>
+      </p:nvGrpSpPr>
+      <p:grpSpPr>
+        <a:xfrm>
+          <a:off x="0" y="0"/>
+          <a:ext cx="0" cy="0"/>
+          <a:chOff x="0" y="0"/>
+          <a:chExt cx="0" cy="0"/>
+        </a:xfrm>
+      </p:grpSpPr>
+      <p:sp>
+        <p:nvSpPr>
+          <p:cNvPr id="4" name="Google Shape;225;p3">
+            <a:extLst>
+              <a:ext uri="{FF2B5EF4-FFF2-40B4-BE49-F238E27FC236}">
+                <a16:creationId xmlns:a16="http://schemas.microsoft.com/office/drawing/2014/main" id="{DE406A44-6CD5-05A3-1CDB-D7CBA4D8321C}"/>
+              </a:ext>
+            </a:extLst>
+          </p:cNvPr>
+          <p:cNvSpPr/>
+          <p:nvPr/>
+        </p:nvSpPr>
+        <p:spPr>
+          <a:xfrm>
+            <a:off x="2279681" y="1983540"/>
+            <a:ext cx="1702607" cy="625556"/>
+          </a:xfrm>
+          <a:prstGeom prst="roundRect">
+            <a:avLst>
+              <a:gd name="adj" fmla="val 16667"/>
+            </a:avLst>
+          </a:prstGeom>
+          <a:solidFill>
+            <a:srgbClr val="6D9EEB"/>
+          </a:solidFill>
+          <a:ln>
+            <a:noFill/>
+          </a:ln>
+        </p:spPr>
+        <p:txBody>
+          <a:bodyPr spcFirstLastPara="1" wrap="square" lIns="127975" tIns="127975" rIns="127975" bIns="127975" anchor="ctr" anchorCtr="0">
+            <a:noAutofit/>
+          </a:bodyPr>
+          <a:lstStyle/>
+          <a:p>
+            <a:pPr marL="0" marR="0" lvl="0" indent="0" algn="ctr" rtl="0">
+              <a:lnSpc>
+                <a:spcPct val="100000"/>
+              </a:lnSpc>
+              <a:spcBef>
+                <a:spcPts val="0"/>
+              </a:spcBef>
+              <a:spcAft>
+                <a:spcPts val="0"/>
+              </a:spcAft>
+              <a:buNone/>
+            </a:pPr>
+            <a:r>
+              <a:rPr lang="en-US" sz="1100" dirty="0" err="1">
+                <a:solidFill>
+                  <a:schemeClr val="lt1"/>
+                </a:solidFill>
+                <a:latin typeface="Microsoft GothicNeo Light" panose="020B0300000101010101" pitchFamily="50" charset="-127"/>
+                <a:ea typeface="Microsoft GothicNeo Light" panose="020B0300000101010101" pitchFamily="50" charset="-127"/>
+                <a:cs typeface="Microsoft GothicNeo Light" panose="020B0300000101010101" pitchFamily="50" charset="-127"/>
+              </a:rPr>
+              <a:t>Recv</a:t>
+            </a:r>
+            <a:endParaRPr lang="en-US" sz="1100" dirty="0">
+              <a:solidFill>
+                <a:schemeClr val="lt1"/>
+              </a:solidFill>
+              <a:latin typeface="Microsoft GothicNeo Light" panose="020B0300000101010101" pitchFamily="50" charset="-127"/>
+              <a:ea typeface="Microsoft GothicNeo Light" panose="020B0300000101010101" pitchFamily="50" charset="-127"/>
+              <a:cs typeface="Microsoft GothicNeo Light" panose="020B0300000101010101" pitchFamily="50" charset="-127"/>
+            </a:endParaRPr>
+          </a:p>
+        </p:txBody>
+      </p:sp>
+      <p:sp>
+        <p:nvSpPr>
+          <p:cNvPr id="5" name="Google Shape;225;p3">
+            <a:extLst>
+              <a:ext uri="{FF2B5EF4-FFF2-40B4-BE49-F238E27FC236}">
+                <a16:creationId xmlns:a16="http://schemas.microsoft.com/office/drawing/2014/main" id="{A0A950E1-BE93-8E68-1A10-81DACF9695BA}"/>
+              </a:ext>
+            </a:extLst>
+          </p:cNvPr>
+          <p:cNvSpPr/>
+          <p:nvPr/>
+        </p:nvSpPr>
+        <p:spPr>
+          <a:xfrm>
+            <a:off x="2279681" y="3456644"/>
+            <a:ext cx="1702607" cy="625556"/>
+          </a:xfrm>
+          <a:prstGeom prst="roundRect">
+            <a:avLst>
+              <a:gd name="adj" fmla="val 16667"/>
+            </a:avLst>
+          </a:prstGeom>
+          <a:solidFill>
+            <a:srgbClr val="6D9EEB"/>
+          </a:solidFill>
+          <a:ln>
+            <a:noFill/>
+          </a:ln>
+        </p:spPr>
+        <p:txBody>
+          <a:bodyPr spcFirstLastPara="1" wrap="square" lIns="127975" tIns="127975" rIns="127975" bIns="127975" anchor="ctr" anchorCtr="0">
+            <a:noAutofit/>
+          </a:bodyPr>
+          <a:lstStyle/>
+          <a:p>
+            <a:pPr marL="0" marR="0" lvl="0" indent="0" algn="ctr" rtl="0">
+              <a:lnSpc>
+                <a:spcPct val="100000"/>
+              </a:lnSpc>
+              <a:spcBef>
+                <a:spcPts val="0"/>
+              </a:spcBef>
+              <a:spcAft>
+                <a:spcPts val="0"/>
+              </a:spcAft>
+              <a:buNone/>
+            </a:pPr>
+            <a:r>
+              <a:rPr lang="en-US" sz="1100" dirty="0" err="1">
+                <a:solidFill>
+                  <a:schemeClr val="lt1"/>
+                </a:solidFill>
+                <a:latin typeface="Microsoft GothicNeo Light" panose="020B0300000101010101" pitchFamily="50" charset="-127"/>
+                <a:ea typeface="Microsoft GothicNeo Light" panose="020B0300000101010101" pitchFamily="50" charset="-127"/>
+                <a:cs typeface="Microsoft GothicNeo Light" panose="020B0300000101010101" pitchFamily="50" charset="-127"/>
+              </a:rPr>
+              <a:t>G_Lock</a:t>
+            </a:r>
+            <a:r>
+              <a:rPr lang="en-US" altLang="ko-KR" sz="1100" dirty="0" err="1">
+                <a:solidFill>
+                  <a:schemeClr val="lt1"/>
+                </a:solidFill>
+                <a:latin typeface="Microsoft GothicNeo Light" panose="020B0300000101010101" pitchFamily="50" charset="-127"/>
+                <a:ea typeface="Microsoft GothicNeo Light" panose="020B0300000101010101" pitchFamily="50" charset="-127"/>
+                <a:cs typeface="Microsoft GothicNeo Light" panose="020B0300000101010101" pitchFamily="50" charset="-127"/>
+              </a:rPr>
+              <a:t>.lock</a:t>
+            </a:r>
+            <a:endParaRPr lang="en-US" sz="1100" dirty="0">
+              <a:solidFill>
+                <a:schemeClr val="lt1"/>
+              </a:solidFill>
+              <a:latin typeface="Microsoft GothicNeo Light" panose="020B0300000101010101" pitchFamily="50" charset="-127"/>
+              <a:ea typeface="Microsoft GothicNeo Light" panose="020B0300000101010101" pitchFamily="50" charset="-127"/>
+              <a:cs typeface="Microsoft GothicNeo Light" panose="020B0300000101010101" pitchFamily="50" charset="-127"/>
+            </a:endParaRPr>
+          </a:p>
+        </p:txBody>
+      </p:sp>
+      <p:sp>
+        <p:nvSpPr>
+          <p:cNvPr id="6" name="Google Shape;225;p3">
+            <a:extLst>
+              <a:ext uri="{FF2B5EF4-FFF2-40B4-BE49-F238E27FC236}">
+                <a16:creationId xmlns:a16="http://schemas.microsoft.com/office/drawing/2014/main" id="{32B3D116-31FD-C6E8-66AA-098959BED25A}"/>
+              </a:ext>
+            </a:extLst>
+          </p:cNvPr>
+          <p:cNvSpPr/>
+          <p:nvPr/>
+        </p:nvSpPr>
+        <p:spPr>
+          <a:xfrm>
+            <a:off x="2279681" y="4304192"/>
+            <a:ext cx="1702607" cy="625556"/>
+          </a:xfrm>
+          <a:prstGeom prst="roundRect">
+            <a:avLst>
+              <a:gd name="adj" fmla="val 16667"/>
+            </a:avLst>
+          </a:prstGeom>
+          <a:solidFill>
+            <a:srgbClr val="6D9EEB"/>
+          </a:solidFill>
+          <a:ln>
+            <a:noFill/>
+          </a:ln>
+        </p:spPr>
+        <p:txBody>
+          <a:bodyPr spcFirstLastPara="1" wrap="square" lIns="127975" tIns="127975" rIns="127975" bIns="127975" anchor="ctr" anchorCtr="0">
+            <a:noAutofit/>
+          </a:bodyPr>
+          <a:lstStyle/>
+          <a:p>
+            <a:pPr marL="0" marR="0" lvl="0" indent="0" algn="ctr" rtl="0">
+              <a:lnSpc>
+                <a:spcPct val="100000"/>
+              </a:lnSpc>
+              <a:spcBef>
+                <a:spcPts val="0"/>
+              </a:spcBef>
+              <a:spcAft>
+                <a:spcPts val="0"/>
+              </a:spcAft>
+              <a:buNone/>
+            </a:pPr>
+            <a:r>
+              <a:rPr lang="ko-KR" altLang="en-US" sz="1100" dirty="0">
+                <a:solidFill>
+                  <a:schemeClr val="lt1"/>
+                </a:solidFill>
+                <a:latin typeface="Microsoft GothicNeo Light" panose="020B0300000101010101" pitchFamily="50" charset="-127"/>
+                <a:ea typeface="Microsoft GothicNeo Light" panose="020B0300000101010101" pitchFamily="50" charset="-127"/>
+                <a:cs typeface="Microsoft GothicNeo Light" panose="020B0300000101010101" pitchFamily="50" charset="-127"/>
+              </a:rPr>
+              <a:t>공통데이터 대입</a:t>
+            </a:r>
+            <a:endParaRPr lang="en-US" sz="1100" dirty="0">
+              <a:solidFill>
+                <a:schemeClr val="lt1"/>
+              </a:solidFill>
+              <a:latin typeface="Microsoft GothicNeo Light" panose="020B0300000101010101" pitchFamily="50" charset="-127"/>
+              <a:ea typeface="Microsoft GothicNeo Light" panose="020B0300000101010101" pitchFamily="50" charset="-127"/>
+              <a:cs typeface="Microsoft GothicNeo Light" panose="020B0300000101010101" pitchFamily="50" charset="-127"/>
+            </a:endParaRPr>
+          </a:p>
+        </p:txBody>
+      </p:sp>
+      <p:sp>
+        <p:nvSpPr>
+          <p:cNvPr id="7" name="Google Shape;225;p3">
+            <a:extLst>
+              <a:ext uri="{FF2B5EF4-FFF2-40B4-BE49-F238E27FC236}">
+                <a16:creationId xmlns:a16="http://schemas.microsoft.com/office/drawing/2014/main" id="{35F3D804-5E60-8AA0-6EB1-516BC42D866C}"/>
+              </a:ext>
+            </a:extLst>
+          </p:cNvPr>
+          <p:cNvSpPr/>
+          <p:nvPr/>
+        </p:nvSpPr>
+        <p:spPr>
+          <a:xfrm>
+            <a:off x="2279681" y="5151740"/>
+            <a:ext cx="1702607" cy="625556"/>
+          </a:xfrm>
+          <a:prstGeom prst="roundRect">
+            <a:avLst>
+              <a:gd name="adj" fmla="val 16667"/>
+            </a:avLst>
+          </a:prstGeom>
+          <a:solidFill>
+            <a:srgbClr val="6D9EEB"/>
+          </a:solidFill>
+          <a:ln>
+            <a:noFill/>
+          </a:ln>
+        </p:spPr>
+        <p:txBody>
+          <a:bodyPr spcFirstLastPara="1" wrap="square" lIns="127975" tIns="127975" rIns="127975" bIns="127975" anchor="ctr" anchorCtr="0">
+            <a:noAutofit/>
+          </a:bodyPr>
+          <a:lstStyle/>
+          <a:p>
+            <a:pPr marL="0" marR="0" lvl="0" indent="0" algn="ctr" rtl="0">
+              <a:lnSpc>
+                <a:spcPct val="100000"/>
+              </a:lnSpc>
+              <a:spcBef>
+                <a:spcPts val="0"/>
+              </a:spcBef>
+              <a:spcAft>
+                <a:spcPts val="0"/>
+              </a:spcAft>
+              <a:buNone/>
+            </a:pPr>
+            <a:r>
+              <a:rPr lang="en-US" sz="1100" dirty="0" err="1">
+                <a:solidFill>
+                  <a:schemeClr val="lt1"/>
+                </a:solidFill>
+                <a:latin typeface="Microsoft GothicNeo Light" panose="020B0300000101010101" pitchFamily="50" charset="-127"/>
+                <a:ea typeface="Microsoft GothicNeo Light" panose="020B0300000101010101" pitchFamily="50" charset="-127"/>
+                <a:cs typeface="Microsoft GothicNeo Light" panose="020B0300000101010101" pitchFamily="50" charset="-127"/>
+              </a:rPr>
+              <a:t>G_Lock.unlock</a:t>
+            </a:r>
+            <a:endParaRPr lang="en-US" sz="1100" dirty="0">
+              <a:solidFill>
+                <a:schemeClr val="lt1"/>
+              </a:solidFill>
+              <a:latin typeface="Microsoft GothicNeo Light" panose="020B0300000101010101" pitchFamily="50" charset="-127"/>
+              <a:ea typeface="Microsoft GothicNeo Light" panose="020B0300000101010101" pitchFamily="50" charset="-127"/>
+              <a:cs typeface="Microsoft GothicNeo Light" panose="020B0300000101010101" pitchFamily="50" charset="-127"/>
+            </a:endParaRPr>
+          </a:p>
+        </p:txBody>
+      </p:sp>
+      <p:sp>
+        <p:nvSpPr>
+          <p:cNvPr id="8" name="Google Shape;225;p3">
+            <a:extLst>
+              <a:ext uri="{FF2B5EF4-FFF2-40B4-BE49-F238E27FC236}">
+                <a16:creationId xmlns:a16="http://schemas.microsoft.com/office/drawing/2014/main" id="{F8819F94-5260-FD83-08FB-C21AE58AE027}"/>
+              </a:ext>
+            </a:extLst>
+          </p:cNvPr>
+          <p:cNvSpPr/>
+          <p:nvPr/>
+        </p:nvSpPr>
+        <p:spPr>
+          <a:xfrm>
+            <a:off x="4822325" y="1983540"/>
+            <a:ext cx="2493318" cy="3168200"/>
+          </a:xfrm>
+          <a:prstGeom prst="roundRect">
+            <a:avLst>
+              <a:gd name="adj" fmla="val 16667"/>
+            </a:avLst>
+          </a:prstGeom>
+          <a:solidFill>
+            <a:srgbClr val="6D9EEB"/>
+          </a:solidFill>
+          <a:ln>
+            <a:noFill/>
+          </a:ln>
+        </p:spPr>
+        <p:txBody>
+          <a:bodyPr spcFirstLastPara="1" wrap="square" lIns="127975" tIns="127975" rIns="127975" bIns="127975" anchor="ctr" anchorCtr="0">
+            <a:noAutofit/>
+          </a:bodyPr>
+          <a:lstStyle/>
+          <a:p>
+            <a:pPr marL="0" marR="0" lvl="0" indent="0" algn="ctr" rtl="0">
+              <a:lnSpc>
+                <a:spcPct val="100000"/>
+              </a:lnSpc>
+              <a:spcBef>
+                <a:spcPts val="0"/>
+              </a:spcBef>
+              <a:spcAft>
+                <a:spcPts val="0"/>
+              </a:spcAft>
+              <a:buNone/>
+            </a:pPr>
+            <a:r>
+              <a:rPr lang="ko-KR" altLang="en-US" sz="1100" dirty="0">
+                <a:solidFill>
+                  <a:schemeClr val="lt1"/>
+                </a:solidFill>
+                <a:latin typeface="Microsoft GothicNeo Light" panose="020B0300000101010101" pitchFamily="50" charset="-127"/>
+                <a:ea typeface="Microsoft GothicNeo Light" panose="020B0300000101010101" pitchFamily="50" charset="-127"/>
+                <a:cs typeface="Microsoft GothicNeo Light" panose="020B0300000101010101" pitchFamily="50" charset="-127"/>
+              </a:rPr>
+              <a:t>공통데이터</a:t>
+            </a:r>
+            <a:endParaRPr lang="en-US" sz="1100" dirty="0">
+              <a:solidFill>
+                <a:schemeClr val="lt1"/>
+              </a:solidFill>
+              <a:latin typeface="Microsoft GothicNeo Light" panose="020B0300000101010101" pitchFamily="50" charset="-127"/>
+              <a:ea typeface="Microsoft GothicNeo Light" panose="020B0300000101010101" pitchFamily="50" charset="-127"/>
+              <a:cs typeface="Microsoft GothicNeo Light" panose="020B0300000101010101" pitchFamily="50" charset="-127"/>
+            </a:endParaRPr>
+          </a:p>
+        </p:txBody>
+      </p:sp>
+      <p:sp>
+        <p:nvSpPr>
+          <p:cNvPr id="9" name="Google Shape;225;p3">
+            <a:extLst>
+              <a:ext uri="{FF2B5EF4-FFF2-40B4-BE49-F238E27FC236}">
+                <a16:creationId xmlns:a16="http://schemas.microsoft.com/office/drawing/2014/main" id="{1B26D355-FF03-B2B8-62DA-5330FE7247C6}"/>
+              </a:ext>
+            </a:extLst>
+          </p:cNvPr>
+          <p:cNvSpPr/>
+          <p:nvPr/>
+        </p:nvSpPr>
+        <p:spPr>
+          <a:xfrm>
+            <a:off x="8155679" y="1983540"/>
+            <a:ext cx="1702607" cy="625556"/>
+          </a:xfrm>
+          <a:prstGeom prst="roundRect">
+            <a:avLst>
+              <a:gd name="adj" fmla="val 16667"/>
+            </a:avLst>
+          </a:prstGeom>
+          <a:solidFill>
+            <a:srgbClr val="6D9EEB"/>
+          </a:solidFill>
+          <a:ln>
+            <a:noFill/>
+          </a:ln>
+        </p:spPr>
+        <p:txBody>
+          <a:bodyPr spcFirstLastPara="1" wrap="square" lIns="127975" tIns="127975" rIns="127975" bIns="127975" anchor="ctr" anchorCtr="0">
+            <a:noAutofit/>
+          </a:bodyPr>
+          <a:lstStyle/>
+          <a:p>
+            <a:pPr marL="0" marR="0" lvl="0" indent="0" algn="ctr" rtl="0">
+              <a:lnSpc>
+                <a:spcPct val="100000"/>
+              </a:lnSpc>
+              <a:spcBef>
+                <a:spcPts val="0"/>
+              </a:spcBef>
+              <a:spcAft>
+                <a:spcPts val="0"/>
+              </a:spcAft>
+              <a:buNone/>
+            </a:pPr>
+            <a:r>
+              <a:rPr lang="en-US" sz="1100" dirty="0" err="1">
+                <a:solidFill>
+                  <a:schemeClr val="lt1"/>
+                </a:solidFill>
+                <a:latin typeface="Microsoft GothicNeo Light" panose="020B0300000101010101" pitchFamily="50" charset="-127"/>
+                <a:ea typeface="Microsoft GothicNeo Light" panose="020B0300000101010101" pitchFamily="50" charset="-127"/>
+                <a:cs typeface="Microsoft GothicNeo Light" panose="020B0300000101010101" pitchFamily="50" charset="-127"/>
+              </a:rPr>
+              <a:t>G_Lock.lock</a:t>
+            </a:r>
+            <a:endParaRPr lang="en-US" sz="1100" dirty="0">
+              <a:solidFill>
+                <a:schemeClr val="lt1"/>
+              </a:solidFill>
+              <a:latin typeface="Microsoft GothicNeo Light" panose="020B0300000101010101" pitchFamily="50" charset="-127"/>
+              <a:ea typeface="Microsoft GothicNeo Light" panose="020B0300000101010101" pitchFamily="50" charset="-127"/>
+              <a:cs typeface="Microsoft GothicNeo Light" panose="020B0300000101010101" pitchFamily="50" charset="-127"/>
+            </a:endParaRPr>
+          </a:p>
+        </p:txBody>
+      </p:sp>
+      <p:sp>
+        <p:nvSpPr>
+          <p:cNvPr id="10" name="Google Shape;225;p3">
+            <a:extLst>
+              <a:ext uri="{FF2B5EF4-FFF2-40B4-BE49-F238E27FC236}">
+                <a16:creationId xmlns:a16="http://schemas.microsoft.com/office/drawing/2014/main" id="{1E712191-AB49-CFF7-4DD3-BA0F294F4EBB}"/>
+              </a:ext>
+            </a:extLst>
+          </p:cNvPr>
+          <p:cNvSpPr/>
+          <p:nvPr/>
+        </p:nvSpPr>
+        <p:spPr>
+          <a:xfrm>
+            <a:off x="8155679" y="3684358"/>
+            <a:ext cx="1702607" cy="625556"/>
+          </a:xfrm>
+          <a:prstGeom prst="roundRect">
+            <a:avLst>
+              <a:gd name="adj" fmla="val 16667"/>
+            </a:avLst>
+          </a:prstGeom>
+          <a:solidFill>
+            <a:srgbClr val="6D9EEB"/>
+          </a:solidFill>
+          <a:ln>
+            <a:noFill/>
+          </a:ln>
+        </p:spPr>
+        <p:txBody>
+          <a:bodyPr spcFirstLastPara="1" wrap="square" lIns="127975" tIns="127975" rIns="127975" bIns="127975" anchor="ctr" anchorCtr="0">
+            <a:noAutofit/>
+          </a:bodyPr>
+          <a:lstStyle/>
+          <a:p>
+            <a:pPr marL="0" marR="0" lvl="0" indent="0" algn="ctr" rtl="0">
+              <a:lnSpc>
+                <a:spcPct val="100000"/>
+              </a:lnSpc>
+              <a:spcBef>
+                <a:spcPts val="0"/>
+              </a:spcBef>
+              <a:spcAft>
+                <a:spcPts val="0"/>
+              </a:spcAft>
+              <a:buNone/>
+            </a:pPr>
+            <a:r>
+              <a:rPr lang="en-US" sz="1100" dirty="0" err="1">
+                <a:solidFill>
+                  <a:schemeClr val="lt1"/>
+                </a:solidFill>
+                <a:latin typeface="Microsoft GothicNeo Light" panose="020B0300000101010101" pitchFamily="50" charset="-127"/>
+                <a:ea typeface="Microsoft GothicNeo Light" panose="020B0300000101010101" pitchFamily="50" charset="-127"/>
+                <a:cs typeface="Microsoft GothicNeo Light" panose="020B0300000101010101" pitchFamily="50" charset="-127"/>
+              </a:rPr>
+              <a:t>G_Lock.unlock</a:t>
+            </a:r>
+            <a:endParaRPr lang="en-US" sz="1100" dirty="0">
+              <a:solidFill>
+                <a:schemeClr val="lt1"/>
+              </a:solidFill>
+              <a:latin typeface="Microsoft GothicNeo Light" panose="020B0300000101010101" pitchFamily="50" charset="-127"/>
+              <a:ea typeface="Microsoft GothicNeo Light" panose="020B0300000101010101" pitchFamily="50" charset="-127"/>
+              <a:cs typeface="Microsoft GothicNeo Light" panose="020B0300000101010101" pitchFamily="50" charset="-127"/>
+            </a:endParaRPr>
+          </a:p>
+        </p:txBody>
+      </p:sp>
+      <p:sp>
+        <p:nvSpPr>
+          <p:cNvPr id="11" name="Google Shape;225;p3">
+            <a:extLst>
+              <a:ext uri="{FF2B5EF4-FFF2-40B4-BE49-F238E27FC236}">
+                <a16:creationId xmlns:a16="http://schemas.microsoft.com/office/drawing/2014/main" id="{3DAD2E50-DE05-ADB9-0C4C-D0F03D5F542C}"/>
+              </a:ext>
+            </a:extLst>
+          </p:cNvPr>
+          <p:cNvSpPr/>
+          <p:nvPr/>
+        </p:nvSpPr>
+        <p:spPr>
+          <a:xfrm>
+            <a:off x="8155679" y="2831088"/>
+            <a:ext cx="1702607" cy="625556"/>
+          </a:xfrm>
+          <a:prstGeom prst="roundRect">
+            <a:avLst>
+              <a:gd name="adj" fmla="val 16667"/>
+            </a:avLst>
+          </a:prstGeom>
+          <a:solidFill>
+            <a:srgbClr val="6D9EEB"/>
+          </a:solidFill>
+          <a:ln>
+            <a:noFill/>
+          </a:ln>
+        </p:spPr>
+        <p:txBody>
+          <a:bodyPr spcFirstLastPara="1" wrap="square" lIns="127975" tIns="127975" rIns="127975" bIns="127975" anchor="ctr" anchorCtr="0">
+            <a:noAutofit/>
+          </a:bodyPr>
+          <a:lstStyle/>
+          <a:p>
+            <a:pPr marL="0" marR="0" lvl="0" indent="0" algn="ctr" rtl="0">
+              <a:lnSpc>
+                <a:spcPct val="100000"/>
+              </a:lnSpc>
+              <a:spcBef>
+                <a:spcPts val="0"/>
+              </a:spcBef>
+              <a:spcAft>
+                <a:spcPts val="0"/>
+              </a:spcAft>
+              <a:buNone/>
+            </a:pPr>
+            <a:r>
+              <a:rPr lang="ko-KR" altLang="en-US" sz="1100" dirty="0">
+                <a:solidFill>
+                  <a:schemeClr val="lt1"/>
+                </a:solidFill>
+                <a:latin typeface="Microsoft GothicNeo Light" panose="020B0300000101010101" pitchFamily="50" charset="-127"/>
+                <a:ea typeface="Microsoft GothicNeo Light" panose="020B0300000101010101" pitchFamily="50" charset="-127"/>
+                <a:cs typeface="Microsoft GothicNeo Light" panose="020B0300000101010101" pitchFamily="50" charset="-127"/>
+              </a:rPr>
+              <a:t>지역 변수</a:t>
+            </a:r>
+            <a:r>
+              <a:rPr lang="en-US" altLang="ko-KR" sz="1100" dirty="0">
+                <a:solidFill>
+                  <a:schemeClr val="lt1"/>
+                </a:solidFill>
+                <a:latin typeface="Microsoft GothicNeo Light" panose="020B0300000101010101" pitchFamily="50" charset="-127"/>
+                <a:ea typeface="Microsoft GothicNeo Light" panose="020B0300000101010101" pitchFamily="50" charset="-127"/>
+                <a:cs typeface="Microsoft GothicNeo Light" panose="020B0300000101010101" pitchFamily="50" charset="-127"/>
+              </a:rPr>
+              <a:t> = </a:t>
+            </a:r>
+            <a:r>
+              <a:rPr lang="ko-KR" altLang="en-US" sz="1100" dirty="0">
+                <a:solidFill>
+                  <a:schemeClr val="lt1"/>
+                </a:solidFill>
+                <a:latin typeface="Microsoft GothicNeo Light" panose="020B0300000101010101" pitchFamily="50" charset="-127"/>
+                <a:ea typeface="Microsoft GothicNeo Light" panose="020B0300000101010101" pitchFamily="50" charset="-127"/>
+                <a:cs typeface="Microsoft GothicNeo Light" panose="020B0300000101010101" pitchFamily="50" charset="-127"/>
+              </a:rPr>
+              <a:t>공용데이터</a:t>
+            </a:r>
+            <a:endParaRPr lang="en-US" altLang="ko-KR" sz="1100" dirty="0">
+              <a:solidFill>
+                <a:schemeClr val="lt1"/>
+              </a:solidFill>
+              <a:latin typeface="Microsoft GothicNeo Light" panose="020B0300000101010101" pitchFamily="50" charset="-127"/>
+              <a:ea typeface="Microsoft GothicNeo Light" panose="020B0300000101010101" pitchFamily="50" charset="-127"/>
+              <a:cs typeface="Microsoft GothicNeo Light" panose="020B0300000101010101" pitchFamily="50" charset="-127"/>
+            </a:endParaRPr>
+          </a:p>
+        </p:txBody>
+      </p:sp>
+      <p:sp>
+        <p:nvSpPr>
+          <p:cNvPr id="12" name="Google Shape;225;p3">
+            <a:extLst>
+              <a:ext uri="{FF2B5EF4-FFF2-40B4-BE49-F238E27FC236}">
+                <a16:creationId xmlns:a16="http://schemas.microsoft.com/office/drawing/2014/main" id="{A500366D-A463-F5C5-B58F-6CC7C714C938}"/>
+              </a:ext>
+            </a:extLst>
+          </p:cNvPr>
+          <p:cNvSpPr/>
+          <p:nvPr/>
+        </p:nvSpPr>
+        <p:spPr>
+          <a:xfrm>
+            <a:off x="8155679" y="4593399"/>
+            <a:ext cx="1702607" cy="625556"/>
+          </a:xfrm>
+          <a:prstGeom prst="roundRect">
+            <a:avLst>
+              <a:gd name="adj" fmla="val 16667"/>
+            </a:avLst>
+          </a:prstGeom>
+          <a:solidFill>
+            <a:srgbClr val="6D9EEB"/>
+          </a:solidFill>
+          <a:ln>
+            <a:noFill/>
+          </a:ln>
+        </p:spPr>
+        <p:txBody>
+          <a:bodyPr spcFirstLastPara="1" wrap="square" lIns="127975" tIns="127975" rIns="127975" bIns="127975" anchor="ctr" anchorCtr="0">
+            <a:noAutofit/>
+          </a:bodyPr>
+          <a:lstStyle/>
+          <a:p>
+            <a:pPr marL="0" marR="0" lvl="0" indent="0" algn="ctr" rtl="0">
+              <a:lnSpc>
+                <a:spcPct val="100000"/>
+              </a:lnSpc>
+              <a:spcBef>
+                <a:spcPts val="0"/>
+              </a:spcBef>
+              <a:spcAft>
+                <a:spcPts val="0"/>
+              </a:spcAft>
+              <a:buNone/>
+            </a:pPr>
+            <a:r>
+              <a:rPr lang="ko-KR" altLang="en-US" sz="1100" dirty="0">
+                <a:solidFill>
+                  <a:schemeClr val="lt1"/>
+                </a:solidFill>
+                <a:latin typeface="Microsoft GothicNeo Light" panose="020B0300000101010101" pitchFamily="50" charset="-127"/>
+                <a:ea typeface="Microsoft GothicNeo Light" panose="020B0300000101010101" pitchFamily="50" charset="-127"/>
+                <a:cs typeface="Microsoft GothicNeo Light" panose="020B0300000101010101" pitchFamily="50" charset="-127"/>
+              </a:rPr>
+              <a:t>업데이트</a:t>
+            </a:r>
+            <a:endParaRPr lang="en-US" altLang="ko-KR" sz="1100" dirty="0">
+              <a:solidFill>
+                <a:schemeClr val="lt1"/>
+              </a:solidFill>
+              <a:latin typeface="Microsoft GothicNeo Light" panose="020B0300000101010101" pitchFamily="50" charset="-127"/>
+              <a:ea typeface="Microsoft GothicNeo Light" panose="020B0300000101010101" pitchFamily="50" charset="-127"/>
+              <a:cs typeface="Microsoft GothicNeo Light" panose="020B0300000101010101" pitchFamily="50" charset="-127"/>
+            </a:endParaRPr>
+          </a:p>
+        </p:txBody>
+      </p:sp>
+      <p:sp>
+        <p:nvSpPr>
+          <p:cNvPr id="13" name="Google Shape;225;p3">
+            <a:extLst>
+              <a:ext uri="{FF2B5EF4-FFF2-40B4-BE49-F238E27FC236}">
+                <a16:creationId xmlns:a16="http://schemas.microsoft.com/office/drawing/2014/main" id="{690EB05F-58BA-DDF9-6846-1A494DDC2D1A}"/>
+              </a:ext>
+            </a:extLst>
+          </p:cNvPr>
+          <p:cNvSpPr/>
+          <p:nvPr/>
+        </p:nvSpPr>
+        <p:spPr>
+          <a:xfrm>
+            <a:off x="8155679" y="5521243"/>
+            <a:ext cx="1702607" cy="625556"/>
+          </a:xfrm>
+          <a:prstGeom prst="roundRect">
+            <a:avLst>
+              <a:gd name="adj" fmla="val 16667"/>
+            </a:avLst>
+          </a:prstGeom>
+          <a:solidFill>
+            <a:srgbClr val="6D9EEB"/>
+          </a:solidFill>
+          <a:ln>
+            <a:noFill/>
+          </a:ln>
+        </p:spPr>
+        <p:txBody>
+          <a:bodyPr spcFirstLastPara="1" wrap="square" lIns="127975" tIns="127975" rIns="127975" bIns="127975" anchor="ctr" anchorCtr="0">
+            <a:noAutofit/>
+          </a:bodyPr>
+          <a:lstStyle/>
+          <a:p>
+            <a:pPr marL="0" marR="0" lvl="0" indent="0" algn="ctr" rtl="0">
+              <a:lnSpc>
+                <a:spcPct val="100000"/>
+              </a:lnSpc>
+              <a:spcBef>
+                <a:spcPts val="0"/>
+              </a:spcBef>
+              <a:spcAft>
+                <a:spcPts val="0"/>
+              </a:spcAft>
+              <a:buNone/>
+            </a:pPr>
+            <a:r>
+              <a:rPr lang="en-US" altLang="ko-KR" sz="1100" dirty="0">
+                <a:solidFill>
+                  <a:schemeClr val="lt1"/>
+                </a:solidFill>
+                <a:latin typeface="Microsoft GothicNeo Light" panose="020B0300000101010101" pitchFamily="50" charset="-127"/>
+                <a:ea typeface="Microsoft GothicNeo Light" panose="020B0300000101010101" pitchFamily="50" charset="-127"/>
+                <a:cs typeface="Microsoft GothicNeo Light" panose="020B0300000101010101" pitchFamily="50" charset="-127"/>
+              </a:rPr>
+              <a:t>Send(</a:t>
+            </a:r>
+            <a:r>
+              <a:rPr lang="ko-KR" altLang="en-US" sz="1100" dirty="0">
+                <a:solidFill>
+                  <a:schemeClr val="lt1"/>
+                </a:solidFill>
+                <a:latin typeface="Microsoft GothicNeo Light" panose="020B0300000101010101" pitchFamily="50" charset="-127"/>
+                <a:ea typeface="Microsoft GothicNeo Light" panose="020B0300000101010101" pitchFamily="50" charset="-127"/>
+                <a:cs typeface="Microsoft GothicNeo Light" panose="020B0300000101010101" pitchFamily="50" charset="-127"/>
+              </a:rPr>
+              <a:t>지역변수</a:t>
+            </a:r>
+            <a:r>
+              <a:rPr lang="en-US" altLang="ko-KR" sz="1100" dirty="0">
+                <a:solidFill>
+                  <a:schemeClr val="lt1"/>
+                </a:solidFill>
+                <a:latin typeface="Microsoft GothicNeo Light" panose="020B0300000101010101" pitchFamily="50" charset="-127"/>
+                <a:ea typeface="Microsoft GothicNeo Light" panose="020B0300000101010101" pitchFamily="50" charset="-127"/>
+                <a:cs typeface="Microsoft GothicNeo Light" panose="020B0300000101010101" pitchFamily="50" charset="-127"/>
+              </a:rPr>
+              <a:t>)</a:t>
+            </a:r>
+          </a:p>
+        </p:txBody>
+      </p:sp>
+      <p:cxnSp>
+        <p:nvCxnSpPr>
+          <p:cNvPr id="16" name="직선 화살표 연결선 15">
+            <a:extLst>
+              <a:ext uri="{FF2B5EF4-FFF2-40B4-BE49-F238E27FC236}">
+                <a16:creationId xmlns:a16="http://schemas.microsoft.com/office/drawing/2014/main" id="{5887AB56-6EC3-747E-F5C5-B87293B80C6B}"/>
+              </a:ext>
+            </a:extLst>
+          </p:cNvPr>
+          <p:cNvCxnSpPr>
+            <a:cxnSpLocks/>
+            <a:stCxn id="4" idx="2"/>
+            <a:endCxn id="56" idx="0"/>
+          </p:cNvCxnSpPr>
+          <p:nvPr/>
+        </p:nvCxnSpPr>
+        <p:spPr>
+          <a:xfrm>
+            <a:off x="3130985" y="2609096"/>
+            <a:ext cx="0" cy="121101"/>
+          </a:xfrm>
+          <a:prstGeom prst="straightConnector1">
+            <a:avLst/>
+          </a:prstGeom>
+          <a:ln>
+            <a:tailEnd type="triangle"/>
+          </a:ln>
+        </p:spPr>
+        <p:style>
+          <a:lnRef idx="1">
+            <a:schemeClr val="dk1"/>
+          </a:lnRef>
+          <a:fillRef idx="0">
+            <a:schemeClr val="dk1"/>
+          </a:fillRef>
+          <a:effectRef idx="0">
+            <a:schemeClr val="dk1"/>
+          </a:effectRef>
+          <a:fontRef idx="minor">
+            <a:schemeClr val="tx1"/>
+          </a:fontRef>
+        </p:style>
+      </p:cxnSp>
+      <p:cxnSp>
+        <p:nvCxnSpPr>
+          <p:cNvPr id="19" name="직선 화살표 연결선 18">
+            <a:extLst>
+              <a:ext uri="{FF2B5EF4-FFF2-40B4-BE49-F238E27FC236}">
+                <a16:creationId xmlns:a16="http://schemas.microsoft.com/office/drawing/2014/main" id="{3EB55F8D-42FF-D7C4-533D-42C30D2D905C}"/>
+              </a:ext>
+            </a:extLst>
+          </p:cNvPr>
+          <p:cNvCxnSpPr>
+            <a:cxnSpLocks/>
+            <a:stCxn id="5" idx="2"/>
+            <a:endCxn id="6" idx="0"/>
+          </p:cNvCxnSpPr>
+          <p:nvPr/>
+        </p:nvCxnSpPr>
+        <p:spPr>
+          <a:xfrm>
+            <a:off x="3130985" y="4082200"/>
+            <a:ext cx="0" cy="221992"/>
+          </a:xfrm>
+          <a:prstGeom prst="straightConnector1">
+            <a:avLst/>
+          </a:prstGeom>
+          <a:ln>
+            <a:tailEnd type="triangle"/>
+          </a:ln>
+        </p:spPr>
+        <p:style>
+          <a:lnRef idx="1">
+            <a:schemeClr val="dk1"/>
+          </a:lnRef>
+          <a:fillRef idx="0">
+            <a:schemeClr val="dk1"/>
+          </a:fillRef>
+          <a:effectRef idx="0">
+            <a:schemeClr val="dk1"/>
+          </a:effectRef>
+          <a:fontRef idx="minor">
+            <a:schemeClr val="tx1"/>
+          </a:fontRef>
+        </p:style>
+      </p:cxnSp>
+      <p:cxnSp>
+        <p:nvCxnSpPr>
+          <p:cNvPr id="23" name="직선 화살표 연결선 22">
+            <a:extLst>
+              <a:ext uri="{FF2B5EF4-FFF2-40B4-BE49-F238E27FC236}">
+                <a16:creationId xmlns:a16="http://schemas.microsoft.com/office/drawing/2014/main" id="{48628436-B6DD-3845-19C1-2FD2A2621C5A}"/>
+              </a:ext>
+            </a:extLst>
+          </p:cNvPr>
+          <p:cNvCxnSpPr>
+            <a:cxnSpLocks/>
+            <a:stCxn id="6" idx="2"/>
+            <a:endCxn id="7" idx="0"/>
+          </p:cNvCxnSpPr>
+          <p:nvPr/>
+        </p:nvCxnSpPr>
+        <p:spPr>
+          <a:xfrm>
+            <a:off x="3130985" y="4929748"/>
+            <a:ext cx="0" cy="221992"/>
+          </a:xfrm>
+          <a:prstGeom prst="straightConnector1">
+            <a:avLst/>
+          </a:prstGeom>
+          <a:ln>
+            <a:tailEnd type="triangle"/>
+          </a:ln>
+        </p:spPr>
+        <p:style>
+          <a:lnRef idx="1">
+            <a:schemeClr val="dk1"/>
+          </a:lnRef>
+          <a:fillRef idx="0">
+            <a:schemeClr val="dk1"/>
+          </a:fillRef>
+          <a:effectRef idx="0">
+            <a:schemeClr val="dk1"/>
+          </a:effectRef>
+          <a:fontRef idx="minor">
+            <a:schemeClr val="tx1"/>
+          </a:fontRef>
+        </p:style>
+      </p:cxnSp>
+      <p:cxnSp>
+        <p:nvCxnSpPr>
+          <p:cNvPr id="26" name="직선 화살표 연결선 25">
+            <a:extLst>
+              <a:ext uri="{FF2B5EF4-FFF2-40B4-BE49-F238E27FC236}">
+                <a16:creationId xmlns:a16="http://schemas.microsoft.com/office/drawing/2014/main" id="{5BDA30D9-E44A-BC71-4438-460DBCA28C33}"/>
+              </a:ext>
+            </a:extLst>
+          </p:cNvPr>
+          <p:cNvCxnSpPr>
+            <a:cxnSpLocks/>
+            <a:stCxn id="6" idx="3"/>
+            <a:endCxn id="8" idx="1"/>
+          </p:cNvCxnSpPr>
+          <p:nvPr/>
+        </p:nvCxnSpPr>
+        <p:spPr>
+          <a:xfrm flipV="1">
+            <a:off x="3982288" y="3567640"/>
+            <a:ext cx="840037" cy="1049330"/>
+          </a:xfrm>
+          <a:prstGeom prst="straightConnector1">
+            <a:avLst/>
+          </a:prstGeom>
+          <a:ln>
+            <a:tailEnd type="triangle"/>
+          </a:ln>
+        </p:spPr>
+        <p:style>
+          <a:lnRef idx="1">
+            <a:schemeClr val="dk1"/>
+          </a:lnRef>
+          <a:fillRef idx="0">
+            <a:schemeClr val="dk1"/>
+          </a:fillRef>
+          <a:effectRef idx="0">
+            <a:schemeClr val="dk1"/>
+          </a:effectRef>
+          <a:fontRef idx="minor">
+            <a:schemeClr val="tx1"/>
+          </a:fontRef>
+        </p:style>
+      </p:cxnSp>
+      <p:cxnSp>
+        <p:nvCxnSpPr>
+          <p:cNvPr id="29" name="직선 화살표 연결선 28">
+            <a:extLst>
+              <a:ext uri="{FF2B5EF4-FFF2-40B4-BE49-F238E27FC236}">
+                <a16:creationId xmlns:a16="http://schemas.microsoft.com/office/drawing/2014/main" id="{54310D96-48AE-A82B-2BD2-4ADB7D7FBCEB}"/>
+              </a:ext>
+            </a:extLst>
+          </p:cNvPr>
+          <p:cNvCxnSpPr>
+            <a:cxnSpLocks/>
+            <a:stCxn id="9" idx="2"/>
+            <a:endCxn id="11" idx="0"/>
+          </p:cNvCxnSpPr>
+          <p:nvPr/>
+        </p:nvCxnSpPr>
+        <p:spPr>
+          <a:xfrm>
+            <a:off x="9006983" y="2609096"/>
+            <a:ext cx="0" cy="221992"/>
+          </a:xfrm>
+          <a:prstGeom prst="straightConnector1">
+            <a:avLst/>
+          </a:prstGeom>
+          <a:ln>
+            <a:tailEnd type="triangle"/>
+          </a:ln>
+        </p:spPr>
+        <p:style>
+          <a:lnRef idx="1">
+            <a:schemeClr val="dk1"/>
+          </a:lnRef>
+          <a:fillRef idx="0">
+            <a:schemeClr val="dk1"/>
+          </a:fillRef>
+          <a:effectRef idx="0">
+            <a:schemeClr val="dk1"/>
+          </a:effectRef>
+          <a:fontRef idx="minor">
+            <a:schemeClr val="tx1"/>
+          </a:fontRef>
+        </p:style>
+      </p:cxnSp>
+      <p:cxnSp>
+        <p:nvCxnSpPr>
+          <p:cNvPr id="31" name="꺾인 연결선[E] 30">
+            <a:extLst>
+              <a:ext uri="{FF2B5EF4-FFF2-40B4-BE49-F238E27FC236}">
+                <a16:creationId xmlns:a16="http://schemas.microsoft.com/office/drawing/2014/main" id="{44911B1B-F318-4C0A-9193-B35D7EC53A6B}"/>
+              </a:ext>
+            </a:extLst>
+          </p:cNvPr>
+          <p:cNvCxnSpPr>
+            <a:cxnSpLocks/>
+            <a:stCxn id="7" idx="2"/>
+            <a:endCxn id="4" idx="0"/>
+          </p:cNvCxnSpPr>
+          <p:nvPr/>
+        </p:nvCxnSpPr>
+        <p:spPr>
+          <a:xfrm rot="5400000" flipH="1">
+            <a:off x="1234107" y="3880418"/>
+            <a:ext cx="3793756" cy="12700"/>
+          </a:xfrm>
+          <a:prstGeom prst="bentConnector5">
+            <a:avLst>
+              <a:gd name="adj1" fmla="val -6026"/>
+              <a:gd name="adj2" fmla="val 8503173"/>
+              <a:gd name="adj3" fmla="val 106026"/>
+            </a:avLst>
+          </a:prstGeom>
+          <a:ln>
+            <a:tailEnd type="triangle"/>
+          </a:ln>
+        </p:spPr>
+        <p:style>
+          <a:lnRef idx="1">
+            <a:schemeClr val="dk1"/>
+          </a:lnRef>
+          <a:fillRef idx="0">
+            <a:schemeClr val="dk1"/>
+          </a:fillRef>
+          <a:effectRef idx="0">
+            <a:schemeClr val="dk1"/>
+          </a:effectRef>
+          <a:fontRef idx="minor">
+            <a:schemeClr val="tx1"/>
+          </a:fontRef>
+        </p:style>
+      </p:cxnSp>
+      <p:cxnSp>
+        <p:nvCxnSpPr>
+          <p:cNvPr id="34" name="꺾인 연결선[E] 33">
+            <a:extLst>
+              <a:ext uri="{FF2B5EF4-FFF2-40B4-BE49-F238E27FC236}">
+                <a16:creationId xmlns:a16="http://schemas.microsoft.com/office/drawing/2014/main" id="{CE29A8D3-1EA4-194C-4EF9-AA7303CEFD0B}"/>
+              </a:ext>
+            </a:extLst>
+          </p:cNvPr>
+          <p:cNvCxnSpPr>
+            <a:cxnSpLocks/>
+            <a:stCxn id="13" idx="2"/>
+            <a:endCxn id="9" idx="0"/>
+          </p:cNvCxnSpPr>
+          <p:nvPr/>
+        </p:nvCxnSpPr>
+        <p:spPr>
+          <a:xfrm rot="5400000" flipH="1">
+            <a:off x="6925353" y="4065170"/>
+            <a:ext cx="4163259" cy="12700"/>
+          </a:xfrm>
+          <a:prstGeom prst="bentConnector5">
+            <a:avLst>
+              <a:gd name="adj1" fmla="val -5491"/>
+              <a:gd name="adj2" fmla="val -9366717"/>
+              <a:gd name="adj3" fmla="val 105491"/>
+            </a:avLst>
+          </a:prstGeom>
+          <a:ln>
+            <a:tailEnd type="triangle"/>
+          </a:ln>
+        </p:spPr>
+        <p:style>
+          <a:lnRef idx="1">
+            <a:schemeClr val="dk1"/>
+          </a:lnRef>
+          <a:fillRef idx="0">
+            <a:schemeClr val="dk1"/>
+          </a:fillRef>
+          <a:effectRef idx="0">
+            <a:schemeClr val="dk1"/>
+          </a:effectRef>
+          <a:fontRef idx="minor">
+            <a:schemeClr val="tx1"/>
+          </a:fontRef>
+        </p:style>
+      </p:cxnSp>
+      <p:cxnSp>
+        <p:nvCxnSpPr>
+          <p:cNvPr id="41" name="직선 화살표 연결선 40">
+            <a:extLst>
+              <a:ext uri="{FF2B5EF4-FFF2-40B4-BE49-F238E27FC236}">
+                <a16:creationId xmlns:a16="http://schemas.microsoft.com/office/drawing/2014/main" id="{14E71BEB-9B34-18AC-2DA1-AA807CFE3C0F}"/>
+              </a:ext>
+            </a:extLst>
+          </p:cNvPr>
+          <p:cNvCxnSpPr>
+            <a:cxnSpLocks/>
+            <a:stCxn id="11" idx="2"/>
+            <a:endCxn id="10" idx="0"/>
+          </p:cNvCxnSpPr>
+          <p:nvPr/>
+        </p:nvCxnSpPr>
+        <p:spPr>
+          <a:xfrm>
+            <a:off x="9006983" y="3456644"/>
+            <a:ext cx="0" cy="227714"/>
+          </a:xfrm>
+          <a:prstGeom prst="straightConnector1">
+            <a:avLst/>
+          </a:prstGeom>
+          <a:ln>
+            <a:tailEnd type="triangle"/>
+          </a:ln>
+        </p:spPr>
+        <p:style>
+          <a:lnRef idx="1">
+            <a:schemeClr val="dk1"/>
+          </a:lnRef>
+          <a:fillRef idx="0">
+            <a:schemeClr val="dk1"/>
+          </a:fillRef>
+          <a:effectRef idx="0">
+            <a:schemeClr val="dk1"/>
+          </a:effectRef>
+          <a:fontRef idx="minor">
+            <a:schemeClr val="tx1"/>
+          </a:fontRef>
+        </p:style>
+      </p:cxnSp>
+      <p:cxnSp>
+        <p:nvCxnSpPr>
+          <p:cNvPr id="44" name="직선 화살표 연결선 43">
+            <a:extLst>
+              <a:ext uri="{FF2B5EF4-FFF2-40B4-BE49-F238E27FC236}">
+                <a16:creationId xmlns:a16="http://schemas.microsoft.com/office/drawing/2014/main" id="{21B779B6-41CE-E737-6C71-9314882F4359}"/>
+              </a:ext>
+            </a:extLst>
+          </p:cNvPr>
+          <p:cNvCxnSpPr>
+            <a:cxnSpLocks/>
+            <a:stCxn id="10" idx="2"/>
+            <a:endCxn id="12" idx="0"/>
+          </p:cNvCxnSpPr>
+          <p:nvPr/>
+        </p:nvCxnSpPr>
+        <p:spPr>
+          <a:xfrm>
+            <a:off x="9006983" y="4309914"/>
+            <a:ext cx="0" cy="283485"/>
+          </a:xfrm>
+          <a:prstGeom prst="straightConnector1">
+            <a:avLst/>
+          </a:prstGeom>
+          <a:ln>
+            <a:tailEnd type="triangle"/>
+          </a:ln>
+        </p:spPr>
+        <p:style>
+          <a:lnRef idx="1">
+            <a:schemeClr val="dk1"/>
+          </a:lnRef>
+          <a:fillRef idx="0">
+            <a:schemeClr val="dk1"/>
+          </a:fillRef>
+          <a:effectRef idx="0">
+            <a:schemeClr val="dk1"/>
+          </a:effectRef>
+          <a:fontRef idx="minor">
+            <a:schemeClr val="tx1"/>
+          </a:fontRef>
+        </p:style>
+      </p:cxnSp>
+      <p:cxnSp>
+        <p:nvCxnSpPr>
+          <p:cNvPr id="47" name="직선 화살표 연결선 46">
+            <a:extLst>
+              <a:ext uri="{FF2B5EF4-FFF2-40B4-BE49-F238E27FC236}">
+                <a16:creationId xmlns:a16="http://schemas.microsoft.com/office/drawing/2014/main" id="{F1EE8CD2-2736-79F3-111A-D04281FA0D37}"/>
+              </a:ext>
+            </a:extLst>
+          </p:cNvPr>
+          <p:cNvCxnSpPr>
+            <a:cxnSpLocks/>
+            <a:stCxn id="12" idx="2"/>
+            <a:endCxn id="13" idx="0"/>
+          </p:cNvCxnSpPr>
+          <p:nvPr/>
+        </p:nvCxnSpPr>
+        <p:spPr>
+          <a:xfrm>
+            <a:off x="9006983" y="5218955"/>
+            <a:ext cx="0" cy="302288"/>
+          </a:xfrm>
+          <a:prstGeom prst="straightConnector1">
+            <a:avLst/>
+          </a:prstGeom>
+          <a:ln>
+            <a:tailEnd type="triangle"/>
+          </a:ln>
+        </p:spPr>
+        <p:style>
+          <a:lnRef idx="1">
+            <a:schemeClr val="dk1"/>
+          </a:lnRef>
+          <a:fillRef idx="0">
+            <a:schemeClr val="dk1"/>
+          </a:fillRef>
+          <a:effectRef idx="0">
+            <a:schemeClr val="dk1"/>
+          </a:effectRef>
+          <a:fontRef idx="minor">
+            <a:schemeClr val="tx1"/>
+          </a:fontRef>
+        </p:style>
+      </p:cxnSp>
+      <p:cxnSp>
+        <p:nvCxnSpPr>
+          <p:cNvPr id="50" name="직선 화살표 연결선 49">
+            <a:extLst>
+              <a:ext uri="{FF2B5EF4-FFF2-40B4-BE49-F238E27FC236}">
+                <a16:creationId xmlns:a16="http://schemas.microsoft.com/office/drawing/2014/main" id="{7A53527F-3A2D-75C2-D471-99DA215CF893}"/>
+              </a:ext>
+            </a:extLst>
+          </p:cNvPr>
+          <p:cNvCxnSpPr>
+            <a:cxnSpLocks/>
+            <a:stCxn id="8" idx="3"/>
+            <a:endCxn id="11" idx="1"/>
+          </p:cNvCxnSpPr>
+          <p:nvPr/>
+        </p:nvCxnSpPr>
+        <p:spPr>
+          <a:xfrm flipV="1">
+            <a:off x="7315643" y="3143866"/>
+            <a:ext cx="840036" cy="423774"/>
+          </a:xfrm>
+          <a:prstGeom prst="straightConnector1">
+            <a:avLst/>
+          </a:prstGeom>
+          <a:ln>
+            <a:tailEnd type="triangle"/>
+          </a:ln>
+        </p:spPr>
+        <p:style>
+          <a:lnRef idx="1">
+            <a:schemeClr val="dk1"/>
+          </a:lnRef>
+          <a:fillRef idx="0">
+            <a:schemeClr val="dk1"/>
+          </a:fillRef>
+          <a:effectRef idx="0">
+            <a:schemeClr val="dk1"/>
+          </a:effectRef>
+          <a:fontRef idx="minor">
+            <a:schemeClr val="tx1"/>
+          </a:fontRef>
+        </p:style>
+      </p:cxnSp>
+      <p:sp>
+        <p:nvSpPr>
+          <p:cNvPr id="56" name="Google Shape;225;p3">
+            <a:extLst>
+              <a:ext uri="{FF2B5EF4-FFF2-40B4-BE49-F238E27FC236}">
+                <a16:creationId xmlns:a16="http://schemas.microsoft.com/office/drawing/2014/main" id="{4843AF8A-DE8D-FDF9-244F-D6DBF5956CAB}"/>
+              </a:ext>
+            </a:extLst>
+          </p:cNvPr>
+          <p:cNvSpPr/>
+          <p:nvPr/>
+        </p:nvSpPr>
+        <p:spPr>
+          <a:xfrm>
+            <a:off x="2279681" y="2730197"/>
+            <a:ext cx="1702607" cy="625556"/>
+          </a:xfrm>
+          <a:prstGeom prst="roundRect">
+            <a:avLst>
+              <a:gd name="adj" fmla="val 16667"/>
+            </a:avLst>
+          </a:prstGeom>
+          <a:solidFill>
+            <a:srgbClr val="6D9EEB"/>
+          </a:solidFill>
+          <a:ln>
+            <a:noFill/>
+          </a:ln>
+        </p:spPr>
+        <p:txBody>
+          <a:bodyPr spcFirstLastPara="1" wrap="square" lIns="127975" tIns="127975" rIns="127975" bIns="127975" anchor="ctr" anchorCtr="0">
+            <a:noAutofit/>
+          </a:bodyPr>
+          <a:lstStyle/>
+          <a:p>
+            <a:pPr marL="0" marR="0" lvl="0" indent="0" algn="ctr" rtl="0">
+              <a:lnSpc>
+                <a:spcPct val="100000"/>
+              </a:lnSpc>
+              <a:spcBef>
+                <a:spcPts val="0"/>
+              </a:spcBef>
+              <a:spcAft>
+                <a:spcPts val="0"/>
+              </a:spcAft>
+              <a:buNone/>
+            </a:pPr>
+            <a:r>
+              <a:rPr lang="en-US" sz="1100" dirty="0" err="1">
+                <a:solidFill>
+                  <a:schemeClr val="lt1"/>
+                </a:solidFill>
+                <a:latin typeface="Microsoft GothicNeo Light" panose="020B0300000101010101" pitchFamily="50" charset="-127"/>
+                <a:ea typeface="Microsoft GothicNeo Light" panose="020B0300000101010101" pitchFamily="50" charset="-127"/>
+                <a:cs typeface="Microsoft GothicNeo Light" panose="020B0300000101010101" pitchFamily="50" charset="-127"/>
+              </a:rPr>
+              <a:t>Recv</a:t>
+            </a:r>
+            <a:r>
+              <a:rPr lang="ko-KR" altLang="en-US" sz="1100" dirty="0">
+                <a:solidFill>
+                  <a:schemeClr val="lt1"/>
+                </a:solidFill>
+                <a:latin typeface="Microsoft GothicNeo Light" panose="020B0300000101010101" pitchFamily="50" charset="-127"/>
+                <a:ea typeface="Microsoft GothicNeo Light" panose="020B0300000101010101" pitchFamily="50" charset="-127"/>
+                <a:cs typeface="Microsoft GothicNeo Light" panose="020B0300000101010101" pitchFamily="50" charset="-127"/>
+              </a:rPr>
+              <a:t> </a:t>
+            </a:r>
+            <a:r>
+              <a:rPr lang="en-US" altLang="ko-KR" sz="1100" dirty="0">
+                <a:solidFill>
+                  <a:schemeClr val="lt1"/>
+                </a:solidFill>
+                <a:latin typeface="Microsoft GothicNeo Light" panose="020B0300000101010101" pitchFamily="50" charset="-127"/>
+                <a:ea typeface="Microsoft GothicNeo Light" panose="020B0300000101010101" pitchFamily="50" charset="-127"/>
+                <a:cs typeface="Microsoft GothicNeo Light" panose="020B0300000101010101" pitchFamily="50" charset="-127"/>
+              </a:rPr>
+              <a:t>-&gt;</a:t>
+            </a:r>
+            <a:r>
+              <a:rPr lang="ko-KR" altLang="en-US" sz="1100" dirty="0">
+                <a:solidFill>
+                  <a:schemeClr val="lt1"/>
+                </a:solidFill>
+                <a:latin typeface="Microsoft GothicNeo Light" panose="020B0300000101010101" pitchFamily="50" charset="-127"/>
+                <a:ea typeface="Microsoft GothicNeo Light" panose="020B0300000101010101" pitchFamily="50" charset="-127"/>
+                <a:cs typeface="Microsoft GothicNeo Light" panose="020B0300000101010101" pitchFamily="50" charset="-127"/>
+              </a:rPr>
+              <a:t> 공통데이터</a:t>
+            </a:r>
+            <a:endParaRPr lang="en-US" altLang="ko-KR" sz="1100" dirty="0">
+              <a:solidFill>
+                <a:schemeClr val="lt1"/>
+              </a:solidFill>
+              <a:latin typeface="Microsoft GothicNeo Light" panose="020B0300000101010101" pitchFamily="50" charset="-127"/>
+              <a:ea typeface="Microsoft GothicNeo Light" panose="020B0300000101010101" pitchFamily="50" charset="-127"/>
+              <a:cs typeface="Microsoft GothicNeo Light" panose="020B0300000101010101" pitchFamily="50" charset="-127"/>
+            </a:endParaRPr>
+          </a:p>
+          <a:p>
+            <a:pPr marL="0" marR="0" lvl="0" indent="0" algn="ctr" rtl="0">
+              <a:lnSpc>
+                <a:spcPct val="100000"/>
+              </a:lnSpc>
+              <a:spcBef>
+                <a:spcPts val="0"/>
+              </a:spcBef>
+              <a:spcAft>
+                <a:spcPts val="0"/>
+              </a:spcAft>
+              <a:buNone/>
+            </a:pPr>
+            <a:r>
+              <a:rPr lang="ko-KR" altLang="en-US" sz="1100" dirty="0">
+                <a:solidFill>
+                  <a:schemeClr val="lt1"/>
+                </a:solidFill>
+                <a:latin typeface="Microsoft GothicNeo Light" panose="020B0300000101010101" pitchFamily="50" charset="-127"/>
+                <a:ea typeface="Microsoft GothicNeo Light" panose="020B0300000101010101" pitchFamily="50" charset="-127"/>
+                <a:cs typeface="Microsoft GothicNeo Light" panose="020B0300000101010101" pitchFamily="50" charset="-127"/>
+              </a:rPr>
+              <a:t>변환 및 연산</a:t>
+            </a:r>
+            <a:endParaRPr lang="en-US" sz="1100" dirty="0">
+              <a:solidFill>
+                <a:schemeClr val="lt1"/>
+              </a:solidFill>
+              <a:latin typeface="Microsoft GothicNeo Light" panose="020B0300000101010101" pitchFamily="50" charset="-127"/>
+              <a:ea typeface="Microsoft GothicNeo Light" panose="020B0300000101010101" pitchFamily="50" charset="-127"/>
+              <a:cs typeface="Microsoft GothicNeo Light" panose="020B0300000101010101" pitchFamily="50" charset="-127"/>
+            </a:endParaRPr>
+          </a:p>
+        </p:txBody>
+      </p:sp>
+      <p:cxnSp>
+        <p:nvCxnSpPr>
+          <p:cNvPr id="58" name="직선 화살표 연결선 57">
+            <a:extLst>
+              <a:ext uri="{FF2B5EF4-FFF2-40B4-BE49-F238E27FC236}">
+                <a16:creationId xmlns:a16="http://schemas.microsoft.com/office/drawing/2014/main" id="{3B1199C1-DAE5-0528-D1E1-E77F20409B69}"/>
+              </a:ext>
+            </a:extLst>
+          </p:cNvPr>
+          <p:cNvCxnSpPr>
+            <a:cxnSpLocks/>
+            <a:stCxn id="56" idx="2"/>
+            <a:endCxn id="5" idx="0"/>
+          </p:cNvCxnSpPr>
+          <p:nvPr/>
+        </p:nvCxnSpPr>
+        <p:spPr>
+          <a:xfrm>
+            <a:off x="3130985" y="3355753"/>
+            <a:ext cx="0" cy="100891"/>
+          </a:xfrm>
+          <a:prstGeom prst="straightConnector1">
+            <a:avLst/>
+          </a:prstGeom>
+          <a:ln>
+            <a:tailEnd type="triangle"/>
+          </a:ln>
+        </p:spPr>
+        <p:style>
+          <a:lnRef idx="1">
+            <a:schemeClr val="dk1"/>
+          </a:lnRef>
+          <a:fillRef idx="0">
+            <a:schemeClr val="dk1"/>
+          </a:fillRef>
+          <a:effectRef idx="0">
+            <a:schemeClr val="dk1"/>
+          </a:effectRef>
+          <a:fontRef idx="minor">
+            <a:schemeClr val="tx1"/>
+          </a:fontRef>
+        </p:style>
+      </p:cxnSp>
+    </p:spTree>
+    <p:extLst>
+      <p:ext uri="{BB962C8B-B14F-4D97-AF65-F5344CB8AC3E}">
+        <p14:creationId xmlns:p14="http://schemas.microsoft.com/office/powerpoint/2010/main" val="3609571055"/>
+      </p:ext>
+    </p:extLst>
+  </p:cSld>
+  <p:clrMapOvr>
+    <a:masterClrMapping/>
+  </p:clrMapOvr>
+</p:sld>
+</file>
+
 <file path=ppt/theme/theme1.xml><?xml version="1.0" encoding="utf-8"?>
 <a:theme xmlns:a="http://schemas.openxmlformats.org/drawingml/2006/main" name="Simple Light">
   <a:themeElements>

</xml_diff>